<commit_message>
Change of text colour
</commit_message>
<xml_diff>
--- a/Honey C-4.pptx
+++ b/Honey C-4.pptx
@@ -140,8 +140,15 @@
         </p14:section>
       </p14:sectionLst>
     </p:ext>
+    <p:ext uri="{EFAFB233-063F-42B5-8137-9DF3F51BA10A}">
+      <p15:sldGuideLst xmlns:p15="http://schemas.microsoft.com/office/powerpoint/2012/main"/>
+    </p:ext>
   </p:extLst>
 </p:presentation>
+</file>
+
+<file path=ppt/revisionInfo.xml><?xml version="1.0" encoding="utf-8"?>
+<p1510:revInfo xmlns:a="http://schemas.openxmlformats.org/drawingml/2006/main" xmlns:r="http://schemas.openxmlformats.org/officeDocument/2006/relationships" xmlns:p1510="http://schemas.microsoft.com/office/powerpoint/2015/10/main"/>
 </file>
 
 <file path=ppt/slideLayouts/slideLayout1.xml><?xml version="1.0" encoding="utf-8"?>
@@ -419,7 +426,7 @@
             <a:fld id="{B61BEF0D-F0BB-DE4B-95CE-6DB70DBA9567}" type="datetimeFigureOut">
               <a:rPr lang="en-US" smtClean="0"/>
               <a:pPr/>
-              <a:t>1/6/2018</a:t>
+              <a:t>1/7/2018</a:t>
             </a:fld>
             <a:endParaRPr lang="en-US" dirty="0"/>
           </a:p>
@@ -835,7 +842,7 @@
             <a:fld id="{B61BEF0D-F0BB-DE4B-95CE-6DB70DBA9567}" type="datetimeFigureOut">
               <a:rPr lang="en-US" smtClean="0"/>
               <a:pPr/>
-              <a:t>1/6/2018</a:t>
+              <a:t>1/7/2018</a:t>
             </a:fld>
             <a:endParaRPr lang="en-US" dirty="0"/>
           </a:p>
@@ -1173,7 +1180,7 @@
             <a:fld id="{B61BEF0D-F0BB-DE4B-95CE-6DB70DBA9567}" type="datetimeFigureOut">
               <a:rPr lang="en-US" smtClean="0"/>
               <a:pPr/>
-              <a:t>1/6/2018</a:t>
+              <a:t>1/7/2018</a:t>
             </a:fld>
             <a:endParaRPr lang="en-US" dirty="0"/>
           </a:p>
@@ -1580,7 +1587,7 @@
             <a:fld id="{B61BEF0D-F0BB-DE4B-95CE-6DB70DBA9567}" type="datetimeFigureOut">
               <a:rPr lang="en-US" smtClean="0"/>
               <a:pPr/>
-              <a:t>1/6/2018</a:t>
+              <a:t>1/7/2018</a:t>
             </a:fld>
             <a:endParaRPr lang="en-US" dirty="0"/>
           </a:p>
@@ -2150,7 +2157,7 @@
             <a:fld id="{B61BEF0D-F0BB-DE4B-95CE-6DB70DBA9567}" type="datetimeFigureOut">
               <a:rPr lang="en-US" smtClean="0"/>
               <a:pPr/>
-              <a:t>1/6/2018</a:t>
+              <a:t>1/7/2018</a:t>
             </a:fld>
             <a:endParaRPr lang="en-US" dirty="0"/>
           </a:p>
@@ -2833,7 +2840,7 @@
             <a:fld id="{B61BEF0D-F0BB-DE4B-95CE-6DB70DBA9567}" type="datetimeFigureOut">
               <a:rPr lang="en-US" smtClean="0"/>
               <a:pPr/>
-              <a:t>1/6/2018</a:t>
+              <a:t>1/7/2018</a:t>
             </a:fld>
             <a:endParaRPr lang="en-US" dirty="0"/>
           </a:p>
@@ -3748,7 +3755,7 @@
             <a:fld id="{B61BEF0D-F0BB-DE4B-95CE-6DB70DBA9567}" type="datetimeFigureOut">
               <a:rPr lang="en-US" smtClean="0"/>
               <a:pPr/>
-              <a:t>1/6/2018</a:t>
+              <a:t>1/7/2018</a:t>
             </a:fld>
             <a:endParaRPr lang="en-US" dirty="0"/>
           </a:p>
@@ -4063,7 +4070,7 @@
             <a:fld id="{B61BEF0D-F0BB-DE4B-95CE-6DB70DBA9567}" type="datetimeFigureOut">
               <a:rPr lang="en-US" smtClean="0"/>
               <a:pPr/>
-              <a:t>1/6/2018</a:t>
+              <a:t>1/7/2018</a:t>
             </a:fld>
             <a:endParaRPr lang="en-US" dirty="0"/>
           </a:p>
@@ -4329,7 +4336,7 @@
             <a:fld id="{B61BEF0D-F0BB-DE4B-95CE-6DB70DBA9567}" type="datetimeFigureOut">
               <a:rPr lang="en-US" smtClean="0"/>
               <a:pPr/>
-              <a:t>1/6/2018</a:t>
+              <a:t>1/7/2018</a:t>
             </a:fld>
             <a:endParaRPr lang="en-US" dirty="0"/>
           </a:p>
@@ -4654,7 +4661,7 @@
             <a:fld id="{B61BEF0D-F0BB-DE4B-95CE-6DB70DBA9567}" type="datetimeFigureOut">
               <a:rPr lang="en-US" smtClean="0"/>
               <a:pPr/>
-              <a:t>1/6/2018</a:t>
+              <a:t>1/7/2018</a:t>
             </a:fld>
             <a:endParaRPr lang="en-US" dirty="0"/>
           </a:p>
@@ -5045,7 +5052,7 @@
             <a:fld id="{B61BEF0D-F0BB-DE4B-95CE-6DB70DBA9567}" type="datetimeFigureOut">
               <a:rPr lang="en-US" smtClean="0"/>
               <a:pPr/>
-              <a:t>1/6/2018</a:t>
+              <a:t>1/7/2018</a:t>
             </a:fld>
             <a:endParaRPr lang="en-US" dirty="0"/>
           </a:p>
@@ -5423,7 +5430,7 @@
             <a:fld id="{B61BEF0D-F0BB-DE4B-95CE-6DB70DBA9567}" type="datetimeFigureOut">
               <a:rPr lang="en-US" smtClean="0"/>
               <a:pPr/>
-              <a:t>1/6/2018</a:t>
+              <a:t>1/7/2018</a:t>
             </a:fld>
             <a:endParaRPr lang="en-US" dirty="0"/>
           </a:p>
@@ -5931,7 +5938,7 @@
             <a:fld id="{B61BEF0D-F0BB-DE4B-95CE-6DB70DBA9567}" type="datetimeFigureOut">
               <a:rPr lang="en-US" smtClean="0"/>
               <a:pPr/>
-              <a:t>1/6/2018</a:t>
+              <a:t>1/7/2018</a:t>
             </a:fld>
             <a:endParaRPr lang="en-US" dirty="0"/>
           </a:p>
@@ -6190,7 +6197,7 @@
             <a:fld id="{B61BEF0D-F0BB-DE4B-95CE-6DB70DBA9567}" type="datetimeFigureOut">
               <a:rPr lang="en-US" smtClean="0"/>
               <a:pPr/>
-              <a:t>1/6/2018</a:t>
+              <a:t>1/7/2018</a:t>
             </a:fld>
             <a:endParaRPr lang="en-US" dirty="0"/>
           </a:p>
@@ -6355,7 +6362,7 @@
             <a:fld id="{B61BEF0D-F0BB-DE4B-95CE-6DB70DBA9567}" type="datetimeFigureOut">
               <a:rPr lang="en-US" smtClean="0"/>
               <a:pPr/>
-              <a:t>1/6/2018</a:t>
+              <a:t>1/7/2018</a:t>
             </a:fld>
             <a:endParaRPr lang="en-US" dirty="0"/>
           </a:p>
@@ -6747,7 +6754,7 @@
             <a:fld id="{B61BEF0D-F0BB-DE4B-95CE-6DB70DBA9567}" type="datetimeFigureOut">
               <a:rPr lang="en-US" smtClean="0"/>
               <a:pPr/>
-              <a:t>1/6/2018</a:t>
+              <a:t>1/7/2018</a:t>
             </a:fld>
             <a:endParaRPr lang="en-US" dirty="0"/>
           </a:p>
@@ -7158,7 +7165,7 @@
             <a:fld id="{B61BEF0D-F0BB-DE4B-95CE-6DB70DBA9567}" type="datetimeFigureOut">
               <a:rPr lang="en-US" smtClean="0"/>
               <a:pPr/>
-              <a:t>1/6/2018</a:t>
+              <a:t>1/7/2018</a:t>
             </a:fld>
             <a:endParaRPr lang="en-US" dirty="0"/>
           </a:p>
@@ -7404,7 +7411,7 @@
             <a:fld id="{B61BEF0D-F0BB-DE4B-95CE-6DB70DBA9567}" type="datetimeFigureOut">
               <a:rPr lang="en-US" smtClean="0"/>
               <a:pPr/>
-              <a:t>1/6/2018</a:t>
+              <a:t>1/7/2018</a:t>
             </a:fld>
             <a:endParaRPr lang="en-US" dirty="0"/>
           </a:p>

</xml_diff>